<commit_message>
Modifying language in correctness proofs to make claims clear and use QED for finished
</commit_message>
<xml_diff>
--- a/files/lectures/mutexcorrectness.pptx
+++ b/files/lectures/mutexcorrectness.pptx
@@ -212,7 +212,7 @@
           <a:p>
             <a:fld id="{90968C49-1136-4CD6-BF84-09BF06A9E6ED}" type="datetimeFigureOut">
               <a:rPr lang="en-US" smtClean="0"/>
-              <a:t>1/12/2024</a:t>
+              <a:t>1/16/2024</a:t>
             </a:fld>
             <a:endParaRPr lang="en-US"/>
           </a:p>
@@ -2204,7 +2204,7 @@
           <a:p>
             <a:fld id="{11008460-8B2F-4AAA-A4E2-10730069204C}" type="datetimeFigureOut">
               <a:rPr lang="en-US" smtClean="0"/>
-              <a:t>1/12/2024</a:t>
+              <a:t>1/16/2024</a:t>
             </a:fld>
             <a:endParaRPr lang="en-US"/>
           </a:p>
@@ -4548,7 +4548,7 @@
           <a:p>
             <a:fld id="{11008460-8B2F-4AAA-A4E2-10730069204C}" type="datetimeFigureOut">
               <a:rPr lang="en-US" smtClean="0"/>
-              <a:t>1/12/2024</a:t>
+              <a:t>1/16/2024</a:t>
             </a:fld>
             <a:endParaRPr lang="en-US"/>
           </a:p>
@@ -6892,7 +6892,7 @@
           <a:p>
             <a:fld id="{11008460-8B2F-4AAA-A4E2-10730069204C}" type="datetimeFigureOut">
               <a:rPr lang="en-US" smtClean="0"/>
-              <a:t>1/12/2024</a:t>
+              <a:t>1/16/2024</a:t>
             </a:fld>
             <a:endParaRPr lang="en-US"/>
           </a:p>
@@ -7334,7 +7334,7 @@
           <a:p>
             <a:fld id="{11008460-8B2F-4AAA-A4E2-10730069204C}" type="datetimeFigureOut">
               <a:rPr lang="en-US" smtClean="0"/>
-              <a:t>1/12/2024</a:t>
+              <a:t>1/16/2024</a:t>
             </a:fld>
             <a:endParaRPr lang="en-US"/>
           </a:p>
@@ -7607,7 +7607,7 @@
           <a:p>
             <a:fld id="{11008460-8B2F-4AAA-A4E2-10730069204C}" type="datetimeFigureOut">
               <a:rPr lang="en-US" smtClean="0"/>
-              <a:t>1/12/2024</a:t>
+              <a:t>1/16/2024</a:t>
             </a:fld>
             <a:endParaRPr lang="en-US"/>
           </a:p>
@@ -7872,7 +7872,7 @@
           <a:p>
             <a:fld id="{11008460-8B2F-4AAA-A4E2-10730069204C}" type="datetimeFigureOut">
               <a:rPr lang="en-US" smtClean="0"/>
-              <a:t>1/12/2024</a:t>
+              <a:t>1/16/2024</a:t>
             </a:fld>
             <a:endParaRPr lang="en-US"/>
           </a:p>
@@ -8288,7 +8288,7 @@
           <a:p>
             <a:fld id="{11008460-8B2F-4AAA-A4E2-10730069204C}" type="datetimeFigureOut">
               <a:rPr lang="en-US" smtClean="0"/>
-              <a:t>1/12/2024</a:t>
+              <a:t>1/16/2024</a:t>
             </a:fld>
             <a:endParaRPr lang="en-US"/>
           </a:p>
@@ -8429,7 +8429,7 @@
           <a:p>
             <a:fld id="{11008460-8B2F-4AAA-A4E2-10730069204C}" type="datetimeFigureOut">
               <a:rPr lang="en-US" smtClean="0"/>
-              <a:t>1/12/2024</a:t>
+              <a:t>1/16/2024</a:t>
             </a:fld>
             <a:endParaRPr lang="en-US"/>
           </a:p>
@@ -8542,7 +8542,7 @@
           <a:p>
             <a:fld id="{11008460-8B2F-4AAA-A4E2-10730069204C}" type="datetimeFigureOut">
               <a:rPr lang="en-US" smtClean="0"/>
-              <a:t>1/12/2024</a:t>
+              <a:t>1/16/2024</a:t>
             </a:fld>
             <a:endParaRPr lang="en-US"/>
           </a:p>
@@ -8853,7 +8853,7 @@
           <a:p>
             <a:fld id="{11008460-8B2F-4AAA-A4E2-10730069204C}" type="datetimeFigureOut">
               <a:rPr lang="en-US" smtClean="0"/>
-              <a:t>1/12/2024</a:t>
+              <a:t>1/16/2024</a:t>
             </a:fld>
             <a:endParaRPr lang="en-US"/>
           </a:p>
@@ -9141,7 +9141,7 @@
           <a:p>
             <a:fld id="{11008460-8B2F-4AAA-A4E2-10730069204C}" type="datetimeFigureOut">
               <a:rPr lang="en-US" smtClean="0"/>
-              <a:t>1/12/2024</a:t>
+              <a:t>1/16/2024</a:t>
             </a:fld>
             <a:endParaRPr lang="en-US"/>
           </a:p>
@@ -11519,7 +11519,7 @@
             <a:fld id="{11008460-8B2F-4AAA-A4E2-10730069204C}" type="datetimeFigureOut">
               <a:rPr lang="en-US" smtClean="0"/>
               <a:pPr/>
-              <a:t>1/12/2024</a:t>
+              <a:t>1/16/2024</a:t>
             </a:fld>
             <a:endParaRPr lang="en-US" dirty="0"/>
           </a:p>
@@ -28877,7 +28877,7 @@
                 </a:solidFill>
                 <a:sym typeface="Symbol" panose="05050102010706020507" pitchFamily="18" charset="2"/>
               </a:rPr>
-              <a:t>klaar</a:t>
+              <a:t>QED</a:t>
             </a:r>
           </a:p>
         </p:txBody>
@@ -29150,7 +29150,7 @@
                 </a:solidFill>
                 <a:sym typeface="Symbol" panose="05050102010706020507" pitchFamily="18" charset="2"/>
               </a:rPr>
-              <a:t> turn=1  [] turn=1 </a:t>
+              <a:t> turn=1  [] turn=1               </a:t>
             </a:r>
             <a:endParaRPr lang="de-DE" altLang="en-US" sz="1600" dirty="0"/>
           </a:p>
@@ -29181,7 +29181,73 @@
                 </a:solidFill>
                 <a:sym typeface="Symbol" panose="05050102010706020507" pitchFamily="18" charset="2"/>
               </a:rPr>
-              <a:t> [] turn=1)     p8          </a:t>
+              <a:t> [] turn=1)     p8</a:t>
+            </a:r>
+          </a:p>
+          <a:p>
+            <a:pPr marL="0" indent="0">
+              <a:buNone/>
+            </a:pPr>
+            <a:r>
+              <a:rPr lang="de-DE" altLang="en-US" sz="1600" b="1" dirty="0">
+                <a:solidFill>
+                  <a:schemeClr val="accent2"/>
+                </a:solidFill>
+                <a:sym typeface="Symbol" panose="05050102010706020507" pitchFamily="18" charset="2"/>
+              </a:rPr>
+              <a:t>                    </a:t>
+            </a:r>
+            <a:r>
+              <a:rPr lang="de-DE" altLang="en-US" sz="1600" dirty="0">
+                <a:solidFill>
+                  <a:schemeClr val="tx1"/>
+                </a:solidFill>
+                <a:sym typeface="Symbol" panose="05050102010706020507" pitchFamily="18" charset="2"/>
+              </a:rPr>
+              <a:t>thus :  </a:t>
+            </a:r>
+            <a:r>
+              <a:rPr lang="de-DE" altLang="en-US" sz="1600" b="1" dirty="0">
+                <a:solidFill>
+                  <a:schemeClr val="accent2"/>
+                </a:solidFill>
+                <a:sym typeface="Symbol" panose="05050102010706020507" pitchFamily="18" charset="2"/>
+              </a:rPr>
+              <a:t>(p2</a:t>
+            </a:r>
+            <a:r>
+              <a:rPr lang="de-DE" altLang="en-US" sz="1600" b="1" dirty="0">
+                <a:solidFill>
+                  <a:schemeClr val="accent2"/>
+                </a:solidFill>
+              </a:rPr>
+              <a:t> </a:t>
+            </a:r>
+            <a:r>
+              <a:rPr lang="de-DE" altLang="en-US" sz="1600" b="1" dirty="0">
+                <a:solidFill>
+                  <a:schemeClr val="accent2"/>
+                </a:solidFill>
+                <a:sym typeface="Symbol" panose="05050102010706020507" pitchFamily="18" charset="2"/>
+              </a:rPr>
+              <a:t> </a:t>
+            </a:r>
+            <a:r>
+              <a:rPr lang="de-DE" altLang="en-US" sz="1600" b="1" dirty="0">
+                <a:solidFill>
+                  <a:schemeClr val="accent2"/>
+                </a:solidFill>
+              </a:rPr>
+              <a:t>q1) </a:t>
+            </a:r>
+            <a:r>
+              <a:rPr lang="de-DE" altLang="en-US" sz="1600" b="1" dirty="0">
+                <a:solidFill>
+                  <a:schemeClr val="accent2"/>
+                </a:solidFill>
+                <a:sym typeface="Symbol" panose="05050102010706020507" pitchFamily="18" charset="2"/>
+              </a:rPr>
+              <a:t>   p8           </a:t>
             </a:r>
             <a:r>
               <a:rPr lang="de-DE" altLang="en-US" sz="1600" dirty="0">
@@ -29495,11 +29561,20 @@
             <a:r>
               <a:rPr lang="de-DE" altLang="en-US" sz="1600" b="1" dirty="0">
                 <a:solidFill>
+                  <a:schemeClr val="tx1"/>
+                </a:solidFill>
+                <a:sym typeface="Symbol" panose="05050102010706020507" pitchFamily="18" charset="2"/>
+              </a:rPr>
+              <a:t>.</a:t>
+            </a:r>
+            <a:r>
+              <a:rPr lang="de-DE" altLang="en-US" sz="1600" b="1" dirty="0">
+                <a:solidFill>
                   <a:schemeClr val="accent2"/>
                 </a:solidFill>
                 <a:sym typeface="Symbol" panose="05050102010706020507" pitchFamily="18" charset="2"/>
               </a:rPr>
-              <a:t>.     turn=1</a:t>
+              <a:t>     turn=1</a:t>
             </a:r>
           </a:p>
           <a:p>
@@ -29551,7 +29626,19 @@
               <a:rPr lang="de-DE" altLang="en-US" sz="1600" dirty="0">
                 <a:sym typeface="Symbol" panose="05050102010706020507" pitchFamily="18" charset="2"/>
               </a:rPr>
-              <a:t>(turn&lt;-2 is only after the c.s of p)</a:t>
+              <a:t>(turn </a:t>
+            </a:r>
+            <a:r>
+              <a:rPr lang="de-DE" altLang="en-US" sz="1600" dirty="0">
+                <a:sym typeface="Wingdings" panose="05000000000000000000" pitchFamily="2" charset="2"/>
+              </a:rPr>
+              <a:t></a:t>
+            </a:r>
+            <a:r>
+              <a:rPr lang="de-DE" altLang="en-US" sz="1600" dirty="0">
+                <a:sym typeface="Symbol" panose="05050102010706020507" pitchFamily="18" charset="2"/>
+              </a:rPr>
+              <a:t> 2 is only after the c.s of p, and we are assuming p never gets to its c.s.)</a:t>
             </a:r>
           </a:p>
           <a:p>

</xml_diff>